<commit_message>
update Keys.elm to 0.15
</commit_message>
<xml_diff>
--- a/lesson/Game Programming with Elm.pptx
+++ b/lesson/Game Programming with Elm.pptx
@@ -7570,13 +7570,18 @@
               <a:rPr lang="en-US" sz="6000" dirty="0" smtClean="0">
                 <a:hlinkClick r:id="rId2"/>
               </a:rPr>
-              <a:t>://bit.ly/elm-class</a:t>
+              <a:t>://</a:t>
+            </a:r>
+            <a:r>
+              <a:rPr lang="en-US" sz="6000" dirty="0" smtClean="0">
+                <a:hlinkClick r:id="rId2"/>
+              </a:rPr>
+              <a:t>bit.ly/elmclass</a:t>
             </a:r>
             <a:r>
               <a:rPr lang="en-US" sz="6000" dirty="0" smtClean="0"/>
               <a:t> </a:t>
             </a:r>
-            <a:endParaRPr lang="en-US" sz="6000" dirty="0" smtClean="0"/>
           </a:p>
           <a:p>
             <a:pPr marL="0" indent="0">

</xml_diff>